<commit_message>
pequena alteração ao ppt(nada de especial :) )
</commit_message>
<xml_diff>
--- a/Apresentação/Apresentação.pptx
+++ b/Apresentação/Apresentação.pptx
@@ -16,7 +16,7 @@
     <p:sldId id="259" r:id="rId7"/>
     <p:sldId id="260" r:id="rId8"/>
     <p:sldId id="261" r:id="rId9"/>
-    <p:sldId id="264" r:id="rId10"/>
+    <p:sldId id="265" r:id="rId10"/>
   </p:sldIdLst>
   <p:sldSz cx="12192000" cy="6858000"/>
   <p:notesSz cx="6858000" cy="9144000"/>
@@ -2798,7 +2798,7 @@
           <a:p>
             <a:fld id="{C898B6DF-180F-4701-8E6B-DBD45FB8F00D}" type="datetimeFigureOut">
               <a:rPr lang="en-GB" smtClean="0"/>
-              <a:t>09/04/2021</a:t>
+              <a:t>11/04/2021</a:t>
             </a:fld>
             <a:endParaRPr lang="en-GB"/>
           </a:p>
@@ -2957,7 +2957,7 @@
           <a:p>
             <a:fld id="{FBE41520-2DDE-4B38-8129-A85E52256D1C}" type="slidenum">
               <a:rPr lang="en-GB" smtClean="0"/>
-              <a:t>‹nº›</a:t>
+              <a:t>‹#›</a:t>
             </a:fld>
             <a:endParaRPr lang="en-GB"/>
           </a:p>
@@ -3331,7 +3331,7 @@
           <a:p>
             <a:fld id="{12241623-A064-4BED-B073-BA4D61433402}" type="datetime1">
               <a:rPr lang="en-US" smtClean="0"/>
-              <a:t>4/9/2021</a:t>
+              <a:t>4/11/2021</a:t>
             </a:fld>
             <a:endParaRPr lang="en-US" dirty="0"/>
           </a:p>
@@ -3374,7 +3374,7 @@
             <a:fld id="{FAEF9944-A4F6-4C59-AEBD-678D6480B8EA}" type="slidenum">
               <a:rPr lang="en-US" smtClean="0"/>
               <a:pPr/>
-              <a:t>‹nº›</a:t>
+              <a:t>‹#›</a:t>
             </a:fld>
             <a:endParaRPr lang="en-US" dirty="0"/>
           </a:p>
@@ -3502,7 +3502,7 @@
           <a:p>
             <a:fld id="{6F86ED0C-1DA7-41F0-94CF-6218B1FEDFF1}" type="datetime1">
               <a:rPr lang="en-US" smtClean="0"/>
-              <a:t>4/9/2021</a:t>
+              <a:t>4/11/2021</a:t>
             </a:fld>
             <a:endParaRPr lang="en-US" dirty="0"/>
           </a:p>
@@ -3546,7 +3546,7 @@
             <a:fld id="{FAEF9944-A4F6-4C59-AEBD-678D6480B8EA}" type="slidenum">
               <a:rPr lang="en-US" smtClean="0"/>
               <a:pPr algn="l"/>
-              <a:t>‹nº›</a:t>
+              <a:t>‹#›</a:t>
             </a:fld>
             <a:endParaRPr lang="en-US" dirty="0"/>
           </a:p>
@@ -3727,7 +3727,7 @@
           <a:p>
             <a:fld id="{EECF02AB-6034-4B88-BC5A-7C17CB0EF809}" type="datetime1">
               <a:rPr lang="en-US" smtClean="0"/>
-              <a:t>4/9/2021</a:t>
+              <a:t>4/11/2021</a:t>
             </a:fld>
             <a:endParaRPr lang="en-US" dirty="0"/>
           </a:p>
@@ -3780,7 +3780,7 @@
             <a:fld id="{FAEF9944-A4F6-4C59-AEBD-678D6480B8EA}" type="slidenum">
               <a:rPr lang="en-US" smtClean="0"/>
               <a:pPr/>
-              <a:t>‹nº›</a:t>
+              <a:t>‹#›</a:t>
             </a:fld>
             <a:endParaRPr lang="en-US" dirty="0"/>
           </a:p>
@@ -3908,7 +3908,7 @@
           <a:p>
             <a:fld id="{22F3E5F3-28EE-488F-BD53-B744C06C3DEC}" type="datetime1">
               <a:rPr lang="en-US" smtClean="0"/>
-              <a:t>4/9/2021</a:t>
+              <a:t>4/11/2021</a:t>
             </a:fld>
             <a:endParaRPr lang="en-US" dirty="0"/>
           </a:p>
@@ -3952,7 +3952,7 @@
             <a:fld id="{FAEF9944-A4F6-4C59-AEBD-678D6480B8EA}" type="slidenum">
               <a:rPr lang="en-US" smtClean="0"/>
               <a:pPr algn="l"/>
-              <a:t>‹nº›</a:t>
+              <a:t>‹#›</a:t>
             </a:fld>
             <a:endParaRPr lang="en-US" dirty="0"/>
           </a:p>
@@ -4216,7 +4216,7 @@
           <a:p>
             <a:fld id="{E72EB70D-CD01-44DA-83B3-8FEB3383D307}" type="datetime1">
               <a:rPr lang="en-US" smtClean="0"/>
-              <a:t>4/9/2021</a:t>
+              <a:t>4/11/2021</a:t>
             </a:fld>
             <a:endParaRPr lang="en-US" dirty="0"/>
           </a:p>
@@ -4276,7 +4276,7 @@
             <a:fld id="{FAEF9944-A4F6-4C59-AEBD-678D6480B8EA}" type="slidenum">
               <a:rPr lang="en-US" smtClean="0"/>
               <a:pPr algn="l"/>
-              <a:t>‹nº›</a:t>
+              <a:t>‹#›</a:t>
             </a:fld>
             <a:endParaRPr lang="en-US" dirty="0"/>
           </a:p>
@@ -4522,7 +4522,7 @@
           <a:p>
             <a:fld id="{D0158CFD-9357-46BE-A189-D637A67C8730}" type="datetime1">
               <a:rPr lang="en-US" smtClean="0"/>
-              <a:t>4/9/2021</a:t>
+              <a:t>4/11/2021</a:t>
             </a:fld>
             <a:endParaRPr lang="en-US" dirty="0"/>
           </a:p>
@@ -4566,7 +4566,7 @@
             <a:fld id="{FAEF9944-A4F6-4C59-AEBD-678D6480B8EA}" type="slidenum">
               <a:rPr lang="en-US" smtClean="0"/>
               <a:pPr algn="l"/>
-              <a:t>‹nº›</a:t>
+              <a:t>‹#›</a:t>
             </a:fld>
             <a:endParaRPr lang="en-US" dirty="0"/>
           </a:p>
@@ -4946,7 +4946,7 @@
           <a:p>
             <a:fld id="{7B4742EE-B331-4632-BD10-A82FED6B6FC0}" type="datetime1">
               <a:rPr lang="en-US" smtClean="0"/>
-              <a:t>4/9/2021</a:t>
+              <a:t>4/11/2021</a:t>
             </a:fld>
             <a:endParaRPr lang="en-US" dirty="0"/>
           </a:p>
@@ -4990,7 +4990,7 @@
             <a:fld id="{FAEF9944-A4F6-4C59-AEBD-678D6480B8EA}" type="slidenum">
               <a:rPr lang="en-US" smtClean="0"/>
               <a:pPr algn="l"/>
-              <a:t>‹nº›</a:t>
+              <a:t>‹#›</a:t>
             </a:fld>
             <a:endParaRPr lang="en-US" dirty="0"/>
           </a:p>
@@ -5066,7 +5066,7 @@
           <a:p>
             <a:fld id="{451BA835-D13F-49F4-8F11-5D576AC65FAD}" type="datetime1">
               <a:rPr lang="en-US" smtClean="0"/>
-              <a:t>4/9/2021</a:t>
+              <a:t>4/11/2021</a:t>
             </a:fld>
             <a:endParaRPr lang="en-US" dirty="0"/>
           </a:p>
@@ -5110,7 +5110,7 @@
             <a:fld id="{FAEF9944-A4F6-4C59-AEBD-678D6480B8EA}" type="slidenum">
               <a:rPr lang="en-US" smtClean="0"/>
               <a:pPr algn="l"/>
-              <a:t>‹nº›</a:t>
+              <a:t>‹#›</a:t>
             </a:fld>
             <a:endParaRPr lang="en-US" dirty="0"/>
           </a:p>
@@ -5163,7 +5163,7 @@
           <a:p>
             <a:fld id="{ADBD1799-ACB5-4CB2-86A2-5C574F1C8706}" type="datetime1">
               <a:rPr lang="en-US" smtClean="0"/>
-              <a:t>4/9/2021</a:t>
+              <a:t>4/11/2021</a:t>
             </a:fld>
             <a:endParaRPr lang="en-US" dirty="0"/>
           </a:p>
@@ -5207,7 +5207,7 @@
             <a:fld id="{FAEF9944-A4F6-4C59-AEBD-678D6480B8EA}" type="slidenum">
               <a:rPr lang="en-US" smtClean="0"/>
               <a:pPr algn="l"/>
-              <a:t>‹nº›</a:t>
+              <a:t>‹#›</a:t>
             </a:fld>
             <a:endParaRPr lang="en-US" dirty="0"/>
           </a:p>
@@ -5438,7 +5438,7 @@
           <a:p>
             <a:fld id="{ED5DD0D6-7A82-473E-879B-C6ECD6CCCFEC}" type="datetime1">
               <a:rPr lang="en-US" smtClean="0"/>
-              <a:t>4/9/2021</a:t>
+              <a:t>4/11/2021</a:t>
             </a:fld>
             <a:endParaRPr lang="en-US" dirty="0"/>
           </a:p>
@@ -5482,7 +5482,7 @@
             <a:fld id="{FAEF9944-A4F6-4C59-AEBD-678D6480B8EA}" type="slidenum">
               <a:rPr lang="en-US" smtClean="0"/>
               <a:pPr algn="l"/>
-              <a:t>‹nº›</a:t>
+              <a:t>‹#›</a:t>
             </a:fld>
             <a:endParaRPr lang="en-US" dirty="0"/>
           </a:p>
@@ -5705,7 +5705,7 @@
           <a:p>
             <a:fld id="{D4605E03-BC17-41A7-854C-DFAB672737DC}" type="datetime1">
               <a:rPr lang="en-US" smtClean="0"/>
-              <a:t>4/9/2021</a:t>
+              <a:t>4/11/2021</a:t>
             </a:fld>
             <a:endParaRPr lang="en-US" dirty="0"/>
           </a:p>
@@ -5749,7 +5749,7 @@
             <a:fld id="{FAEF9944-A4F6-4C59-AEBD-678D6480B8EA}" type="slidenum">
               <a:rPr lang="en-US" smtClean="0"/>
               <a:pPr algn="l"/>
-              <a:t>‹nº›</a:t>
+              <a:t>‹#›</a:t>
             </a:fld>
             <a:endParaRPr lang="en-US" dirty="0"/>
           </a:p>
@@ -5956,7 +5956,7 @@
           <a:p>
             <a:fld id="{C4408324-A84C-4A45-93B6-78D079CCE772}" type="datetime1">
               <a:rPr lang="en-US" smtClean="0"/>
-              <a:t>4/9/2021</a:t>
+              <a:t>4/11/2021</a:t>
             </a:fld>
             <a:endParaRPr lang="en-US" dirty="0"/>
           </a:p>
@@ -6032,7 +6032,7 @@
             <a:fld id="{FAEF9944-A4F6-4C59-AEBD-678D6480B8EA}" type="slidenum">
               <a:rPr lang="en-US" smtClean="0"/>
               <a:pPr algn="l"/>
-              <a:t>‹nº›</a:t>
+              <a:t>‹#›</a:t>
             </a:fld>
             <a:endParaRPr lang="en-US" dirty="0"/>
           </a:p>
@@ -6972,12 +6972,12 @@
               <a:t>Neste projeto pretendemos desenvolver uma aplicação de leilões online onde os dados irão ser guardados numa base de dados. A interação com o utilizador irá ser efetuada com recurso a uma API desenvolvida em </a:t>
             </a:r>
             <a:r>
-              <a:rPr lang="pt-PT" dirty="0" err="1"/>
+              <a:rPr lang="pt-PT" i="1" dirty="0"/>
               <a:t>Python</a:t>
             </a:r>
             <a:r>
               <a:rPr lang="pt-PT" dirty="0"/>
-              <a:t> a ser executada sobre a base de dados. Os utilizadores poderão criar leilões para venda de artigos ou licitar noutros leilões em decurso.</a:t>
+              <a:t>. Os utilizadores poderão criar leilões para venda de artigos ou licitar noutros leilões em decurso.</a:t>
             </a:r>
           </a:p>
         </p:txBody>
@@ -7034,10 +7034,9 @@
           <a:lstStyle/>
           <a:p>
             <a:r>
-              <a:rPr lang="pt-PT"/>
-              <a:t>Operações</a:t>
-            </a:r>
-            <a:endParaRPr lang="pt-PT" dirty="0"/>
+              <a:rPr lang="pt-PT" dirty="0"/>
+              <a:t>Operations</a:t>
+            </a:r>
           </a:p>
         </p:txBody>
       </p:sp>
@@ -7063,73 +7062,72 @@
           <a:lstStyle/>
           <a:p>
             <a:r>
-              <a:rPr lang="pt-PT"/>
+              <a:rPr lang="pt-PT" dirty="0"/>
               <a:t>As operações disponíveis para o utilizador são:</a:t>
             </a:r>
           </a:p>
           <a:p>
             <a:pPr lvl="1"/>
             <a:r>
-              <a:rPr lang="pt-PT"/>
-              <a:t>Registo e autenticação no servidor;</a:t>
+              <a:rPr lang="pt-PT" dirty="0"/>
+              <a:t>Registo e autenticação na base de dados;</a:t>
             </a:r>
           </a:p>
           <a:p>
             <a:pPr lvl="1"/>
             <a:r>
-              <a:rPr lang="pt-PT"/>
-              <a:t>Criar leilão para venda de artigo;</a:t>
+              <a:rPr lang="pt-PT" dirty="0"/>
+              <a:t>Criar leilão para a venda de um artigo;</a:t>
             </a:r>
           </a:p>
           <a:p>
             <a:pPr lvl="1"/>
             <a:r>
-              <a:rPr lang="pt-PT"/>
-              <a:t>Visualizar leilões existentes;</a:t>
+              <a:rPr lang="pt-PT" dirty="0"/>
+              <a:t>Aceder aos seus leilões;</a:t>
             </a:r>
           </a:p>
           <a:p>
             <a:pPr lvl="1"/>
             <a:r>
-              <a:rPr lang="pt-PT"/>
-              <a:t>Pesquisar leilões por artigo;</a:t>
+              <a:rPr lang="pt-PT" dirty="0"/>
+              <a:t>Pesquisar leilões de um artigo artigo;</a:t>
             </a:r>
           </a:p>
           <a:p>
             <a:pPr lvl="1"/>
             <a:r>
-              <a:rPr lang="pt-PT"/>
+              <a:rPr lang="pt-PT" dirty="0"/>
               <a:t>Consultar detalhes de um leilão;</a:t>
             </a:r>
           </a:p>
           <a:p>
             <a:pPr lvl="1"/>
             <a:r>
-              <a:rPr lang="pt-PT"/>
+              <a:rPr lang="pt-PT" dirty="0"/>
               <a:t>Efetuar licitação num leilão;</a:t>
             </a:r>
           </a:p>
           <a:p>
             <a:pPr lvl="1"/>
             <a:r>
-              <a:rPr lang="pt-PT"/>
-              <a:t>Visualizar todos os leilões que o utilizador participa;</a:t>
+              <a:rPr lang="pt-PT" dirty="0"/>
+              <a:t>Visualizar todos os leilões em que o utilizador participa;</a:t>
             </a:r>
           </a:p>
           <a:p>
             <a:pPr lvl="1"/>
             <a:r>
-              <a:rPr lang="pt-PT"/>
+              <a:rPr lang="pt-PT" dirty="0"/>
               <a:t>Editar leilão (vendedor apenas, histórico ficará guardado);</a:t>
             </a:r>
           </a:p>
           <a:p>
             <a:pPr lvl="1"/>
             <a:r>
-              <a:rPr lang="pt-PT"/>
+              <a:rPr lang="pt-PT" dirty="0"/>
               <a:t>Mandar mensagem ao vendedor.</a:t>
             </a:r>
-            <a:endParaRPr lang="pt-PT" dirty="0"/>
           </a:p>
         </p:txBody>
       </p:sp>
@@ -7186,7 +7184,7 @@
           <a:p>
             <a:r>
               <a:rPr lang="pt-PT" dirty="0"/>
-              <a:t>conflitos</a:t>
+              <a:t>Conflicts</a:t>
             </a:r>
           </a:p>
         </p:txBody>
@@ -7333,20 +7331,29 @@
           <a:bodyPr/>
           <a:lstStyle/>
           <a:p>
+            <a:pPr algn="just"/>
             <a:r>
               <a:rPr lang="pt-PT" dirty="0"/>
               <a:t>A API irá ser desenvolvida em </a:t>
             </a:r>
             <a:r>
-              <a:rPr lang="pt-PT" dirty="0" err="1"/>
+              <a:rPr lang="pt-PT" i="1" dirty="0" err="1"/>
               <a:t>Python</a:t>
             </a:r>
             <a:r>
               <a:rPr lang="pt-PT" dirty="0"/>
-              <a:t> recorrendo ao módulo psycopg2 para conexão à base de dados. A base de dados irá ser gerenciada pelo software </a:t>
-            </a:r>
-            <a:r>
-              <a:rPr lang="pt-PT" dirty="0" err="1"/>
+              <a:t> recorrendo ao módulo </a:t>
+            </a:r>
+            <a:r>
+              <a:rPr lang="pt-PT" i="1" dirty="0"/>
+              <a:t>psycopg2</a:t>
+            </a:r>
+            <a:r>
+              <a:rPr lang="pt-PT" dirty="0"/>
+              <a:t> para conexão à base de dados. A base de dados irá ser gerida pelo software </a:t>
+            </a:r>
+            <a:r>
+              <a:rPr lang="pt-PT" i="1" dirty="0"/>
               <a:t>PostgreSQL</a:t>
             </a:r>
             <a:r>
@@ -7471,6 +7478,55 @@
       </p:grpSpPr>
       <p:sp>
         <p:nvSpPr>
+          <p:cNvPr id="3" name="Rectangle 2">
+            <a:extLst>
+              <a:ext uri="{FF2B5EF4-FFF2-40B4-BE49-F238E27FC236}">
+                <a16:creationId xmlns:a16="http://schemas.microsoft.com/office/drawing/2014/main" id="{D53BEF86-51AF-46A8-A493-4D6C411CAEAB}"/>
+              </a:ext>
+            </a:extLst>
+          </p:cNvPr>
+          <p:cNvSpPr/>
+          <p:nvPr/>
+        </p:nvSpPr>
+        <p:spPr>
+          <a:xfrm>
+            <a:off x="742494" y="1996198"/>
+            <a:ext cx="10758195" cy="4670379"/>
+          </a:xfrm>
+          <a:prstGeom prst="rect">
+            <a:avLst/>
+          </a:prstGeom>
+          <a:solidFill>
+            <a:schemeClr val="tx1"/>
+          </a:solidFill>
+        </p:spPr>
+        <p:style>
+          <a:lnRef idx="2">
+            <a:schemeClr val="accent1">
+              <a:shade val="50000"/>
+            </a:schemeClr>
+          </a:lnRef>
+          <a:fillRef idx="1">
+            <a:schemeClr val="accent1"/>
+          </a:fillRef>
+          <a:effectRef idx="0">
+            <a:schemeClr val="accent1"/>
+          </a:effectRef>
+          <a:fontRef idx="minor">
+            <a:schemeClr val="lt1"/>
+          </a:fontRef>
+        </p:style>
+        <p:txBody>
+          <a:bodyPr rtlCol="0" anchor="ctr"/>
+          <a:lstStyle/>
+          <a:p>
+            <a:pPr algn="ctr"/>
+            <a:endParaRPr lang="en-GB"/>
+          </a:p>
+        </p:txBody>
+      </p:sp>
+      <p:sp>
+        <p:nvSpPr>
           <p:cNvPr id="2" name="Title 1">
             <a:extLst>
               <a:ext uri="{FF2B5EF4-FFF2-40B4-BE49-F238E27FC236}">
@@ -7491,7 +7547,7 @@
           <a:lstStyle/>
           <a:p>
             <a:r>
-              <a:rPr lang="en-US" dirty="0"/>
+              <a:rPr lang="en-US"/>
               <a:t>ER diagram</a:t>
             </a:r>
             <a:endParaRPr lang="en-GB" dirty="0"/>
@@ -7528,7 +7584,7 @@
         </p:blipFill>
         <p:spPr>
           <a:xfrm>
-            <a:off x="1203325" y="2032275"/>
+            <a:off x="1281505" y="2169968"/>
             <a:ext cx="9783763" cy="4165051"/>
           </a:xfrm>
         </p:spPr>
@@ -7565,13 +7621,62 @@
       </p:grpSpPr>
       <p:sp>
         <p:nvSpPr>
-          <p:cNvPr id="2" name="Título 1">
+          <p:cNvPr id="3" name="Rectangle 2">
             <a:extLst>
               <a:ext uri="{FF2B5EF4-FFF2-40B4-BE49-F238E27FC236}">
-                <a16:creationId xmlns:a16="http://schemas.microsoft.com/office/drawing/2014/main" id="{C1A4E7E8-B0AF-4B3F-AC39-639C4983EEAA}"/>
+                <a16:creationId xmlns:a16="http://schemas.microsoft.com/office/drawing/2014/main" id="{D53BEF86-51AF-46A8-A493-4D6C411CAEAB}"/>
               </a:ext>
             </a:extLst>
           </p:cNvPr>
+          <p:cNvSpPr/>
+          <p:nvPr/>
+        </p:nvSpPr>
+        <p:spPr>
+          <a:xfrm>
+            <a:off x="742494" y="1996198"/>
+            <a:ext cx="10758195" cy="4670379"/>
+          </a:xfrm>
+          <a:prstGeom prst="rect">
+            <a:avLst/>
+          </a:prstGeom>
+          <a:solidFill>
+            <a:schemeClr val="tx1"/>
+          </a:solidFill>
+        </p:spPr>
+        <p:style>
+          <a:lnRef idx="2">
+            <a:schemeClr val="accent1">
+              <a:shade val="50000"/>
+            </a:schemeClr>
+          </a:lnRef>
+          <a:fillRef idx="1">
+            <a:schemeClr val="accent1"/>
+          </a:fillRef>
+          <a:effectRef idx="0">
+            <a:schemeClr val="accent1"/>
+          </a:effectRef>
+          <a:fontRef idx="minor">
+            <a:schemeClr val="lt1"/>
+          </a:fontRef>
+        </p:style>
+        <p:txBody>
+          <a:bodyPr rtlCol="0" anchor="ctr"/>
+          <a:lstStyle/>
+          <a:p>
+            <a:pPr algn="ctr"/>
+            <a:endParaRPr lang="en-GB"/>
+          </a:p>
+        </p:txBody>
+      </p:sp>
+      <p:sp>
+        <p:nvSpPr>
+          <p:cNvPr id="2" name="Title 1">
+            <a:extLst>
+              <a:ext uri="{FF2B5EF4-FFF2-40B4-BE49-F238E27FC236}">
+                <a16:creationId xmlns:a16="http://schemas.microsoft.com/office/drawing/2014/main" id="{ABEE40E1-3CF2-423F-B25C-5EAD6F6A82D4}"/>
+              </a:ext>
+            </a:extLst>
+          </p:cNvPr>
           <p:cNvSpPr>
             <a:spLocks noGrp="1"/>
           </p:cNvSpPr>
@@ -7585,18 +7690,19 @@
           <a:lstStyle/>
           <a:p>
             <a:r>
-              <a:rPr lang="pt-PT" dirty="0"/>
-              <a:t>Tabelas</a:t>
-            </a:r>
+              <a:rPr lang="en-US" dirty="0"/>
+              <a:t>Tables</a:t>
+            </a:r>
+            <a:endParaRPr lang="en-GB" dirty="0"/>
           </a:p>
         </p:txBody>
       </p:sp>
       <p:pic>
         <p:nvPicPr>
-          <p:cNvPr id="5" name="Marcador de Posição de Conteúdo 4">
+          <p:cNvPr id="7" name="Marcador de Posição de Conteúdo 4">
             <a:extLst>
               <a:ext uri="{FF2B5EF4-FFF2-40B4-BE49-F238E27FC236}">
-                <a16:creationId xmlns:a16="http://schemas.microsoft.com/office/drawing/2014/main" id="{77FE2AFC-9676-4E8F-9AF6-8864603AA272}"/>
+                <a16:creationId xmlns:a16="http://schemas.microsoft.com/office/drawing/2014/main" id="{EE4B2CFA-5028-42AD-9C20-A3C0BBCB4E9B}"/>
               </a:ext>
             </a:extLst>
           </p:cNvPr>
@@ -7621,7 +7727,7 @@
         </p:blipFill>
         <p:spPr>
           <a:xfrm>
-            <a:off x="1203325" y="2077032"/>
+            <a:off x="1202919" y="2177856"/>
             <a:ext cx="9783763" cy="4075537"/>
           </a:xfrm>
         </p:spPr>
@@ -7629,7 +7735,7 @@
     </p:spTree>
     <p:extLst>
       <p:ext uri="{BB962C8B-B14F-4D97-AF65-F5344CB8AC3E}">
-        <p14:creationId xmlns:p14="http://schemas.microsoft.com/office/powerpoint/2010/main" val="2684473693"/>
+        <p14:creationId xmlns:p14="http://schemas.microsoft.com/office/powerpoint/2010/main" val="3396809642"/>
       </p:ext>
     </p:extLst>
   </p:cSld>

</xml_diff>